<commit_message>
add notes re sharing permissions + update sharing diagram
</commit_message>
<xml_diff>
--- a/docs/sharing/images/resource/SharingSlide-Examples.pptx
+++ b/docs/sharing/images/resource/SharingSlide-Examples.pptx
@@ -142,7 +142,7 @@
 <file path=ppt/revisionInfo.xml><?xml version="1.0" encoding="utf-8"?>
 <p1510:revInfo xmlns:a="http://schemas.openxmlformats.org/drawingml/2006/main" xmlns:r="http://schemas.openxmlformats.org/officeDocument/2006/relationships" xmlns:p1510="http://schemas.microsoft.com/office/powerpoint/2015/10/main">
   <p1510:revLst>
-    <p1510:client id="{1E987C4C-2262-7244-B744-141F07965890}" v="9" dt="2024-05-16T15:56:24.209"/>
+    <p1510:client id="{7BBCE56A-CCC1-25CC-7763-688D9C0F9377}" v="30" dt="2024-05-29T20:55:25.960"/>
   </p1510:revLst>
 </p1510:revInfo>
 </file>
@@ -229,7 +229,7 @@
           <a:p>
             <a:fld id="{4D1F6935-C280-DF42-97BC-3B68990535A8}" type="datetimeFigureOut">
               <a:rPr lang="en-US" smtClean="0"/>
-              <a:t>5/28/2024</a:t>
+              <a:t>5/29/2024</a:t>
             </a:fld>
             <a:endParaRPr lang="en-US"/>
           </a:p>
@@ -26968,7 +26968,7 @@
               </a:spcAft>
             </a:pPr>
             <a:r>
-              <a:rPr lang="en-US" sz="1000" dirty="0">
+              <a:rPr lang="en-US" sz="1000">
                 <a:solidFill>
                   <a:schemeClr val="bg1"/>
                 </a:solidFill>
@@ -26984,20 +26984,14 @@
               </a:spcAft>
             </a:pPr>
             <a:r>
-              <a:rPr lang="en-US" sz="1000" dirty="0" err="1">
+              <a:rPr lang="en-US" sz="1000">
                 <a:solidFill>
                   <a:schemeClr val="bg1"/>
                 </a:solidFill>
                 <a:latin typeface="+mj-lt"/>
               </a:rPr>
-              <a:t>Bidstream</a:t>
-            </a:r>
-            <a:endParaRPr lang="en-US" sz="1000" dirty="0">
-              <a:solidFill>
-                <a:schemeClr val="bg1"/>
-              </a:solidFill>
-              <a:latin typeface="+mj-lt"/>
-            </a:endParaRPr>
+              <a:t>Bid Stream</a:t>
+            </a:r>
           </a:p>
         </p:txBody>
       </p:sp>
@@ -27015,7 +27009,7 @@
         </p:nvSpPr>
         <p:spPr>
           <a:xfrm>
-            <a:off x="4148160" y="2418118"/>
+            <a:off x="-280493" y="2418118"/>
             <a:ext cx="2112579" cy="307540"/>
           </a:xfrm>
           <a:prstGeom prst="rect">
@@ -27035,13 +27029,13 @@
               </a:spcAft>
             </a:pPr>
             <a:r>
-              <a:rPr lang="en-US" sz="1000">
+              <a:rPr lang="en-US" sz="1000" dirty="0">
                 <a:solidFill>
                   <a:schemeClr val="bg1"/>
                 </a:solidFill>
                 <a:latin typeface="+mj-lt"/>
               </a:rPr>
-              <a:t>Publisher Receives,</a:t>
+              <a:t>Publisher Sends </a:t>
             </a:r>
           </a:p>
           <a:p>
@@ -27051,13 +27045,13 @@
               </a:spcAft>
             </a:pPr>
             <a:r>
-              <a:rPr lang="en-US" sz="1000">
+              <a:rPr lang="en-US" sz="1000" dirty="0">
                 <a:solidFill>
                   <a:schemeClr val="bg1"/>
                 </a:solidFill>
                 <a:latin typeface="+mj-lt"/>
               </a:rPr>
-              <a:t>Matches to Inventory</a:t>
+              <a:t>UID2 token</a:t>
             </a:r>
           </a:p>
         </p:txBody>
@@ -28399,7 +28393,7 @@
         </p:nvSpPr>
         <p:spPr>
           <a:xfrm>
-            <a:off x="-281003" y="2348328"/>
+            <a:off x="4087293" y="2408684"/>
             <a:ext cx="2112579" cy="307540"/>
           </a:xfrm>
           <a:prstGeom prst="rect">
@@ -28419,13 +28413,13 @@
               </a:spcAft>
             </a:pPr>
             <a:r>
-              <a:rPr lang="en-US" sz="1000">
+              <a:rPr lang="en-US" sz="1000" dirty="0">
                 <a:solidFill>
                   <a:schemeClr val="bg1"/>
                 </a:solidFill>
                 <a:latin typeface="+mj-lt"/>
               </a:rPr>
-              <a:t>DSP Sends </a:t>
+              <a:t>DSP Receives</a:t>
             </a:r>
           </a:p>
           <a:p>
@@ -28435,13 +28429,13 @@
               </a:spcAft>
             </a:pPr>
             <a:r>
-              <a:rPr lang="en-US" sz="1000">
+              <a:rPr lang="en-US" sz="1000" dirty="0">
                 <a:solidFill>
                   <a:schemeClr val="bg1"/>
                 </a:solidFill>
                 <a:latin typeface="+mj-lt"/>
               </a:rPr>
-              <a:t>UID2 Token</a:t>
+              <a:t>UID2 Token, Matches to Inventory</a:t>
             </a:r>
           </a:p>
         </p:txBody>

</xml_diff>